<commit_message>
Finished up component specification doc
</commit_message>
<xml_diff>
--- a/doc/component_doc.pptx
+++ b/doc/component_doc.pptx
@@ -3420,7 +3420,87 @@
           <a:lstStyle/>
           <a:p>
             <a:pPr algn="ctr"/>
-            <a:endParaRPr lang="en-US"/>
+            <a:endParaRPr lang="en-US" dirty="0"/>
+          </a:p>
+          <a:p>
+            <a:pPr algn="ctr"/>
+            <a:endParaRPr lang="en-US" dirty="0"/>
+          </a:p>
+          <a:p>
+            <a:pPr algn="ctr"/>
+            <a:endParaRPr lang="en-US" dirty="0"/>
+          </a:p>
+          <a:p>
+            <a:pPr algn="ctr"/>
+            <a:endParaRPr lang="en-US" dirty="0"/>
+          </a:p>
+          <a:p>
+            <a:pPr algn="ctr"/>
+            <a:endParaRPr lang="en-US" dirty="0"/>
+          </a:p>
+          <a:p>
+            <a:pPr algn="ctr"/>
+            <a:endParaRPr lang="en-US" dirty="0"/>
+          </a:p>
+          <a:p>
+            <a:pPr algn="ctr"/>
+            <a:endParaRPr lang="en-US" dirty="0"/>
+          </a:p>
+          <a:p>
+            <a:pPr algn="ctr"/>
+            <a:endParaRPr lang="en-US" dirty="0"/>
+          </a:p>
+          <a:p>
+            <a:pPr algn="ctr"/>
+            <a:endParaRPr lang="en-US" dirty="0"/>
+          </a:p>
+          <a:p>
+            <a:pPr algn="ctr"/>
+            <a:endParaRPr lang="en-US" dirty="0"/>
+          </a:p>
+          <a:p>
+            <a:pPr algn="ctr"/>
+            <a:endParaRPr lang="en-US" dirty="0"/>
+          </a:p>
+          <a:p>
+            <a:pPr algn="ctr"/>
+            <a:endParaRPr lang="en-US" dirty="0"/>
+          </a:p>
+          <a:p>
+            <a:pPr algn="ctr"/>
+            <a:endParaRPr lang="en-US" dirty="0"/>
+          </a:p>
+          <a:p>
+            <a:pPr algn="ctr"/>
+            <a:endParaRPr lang="en-US" dirty="0"/>
+          </a:p>
+          <a:p>
+            <a:pPr algn="ctr"/>
+            <a:endParaRPr lang="en-US" dirty="0"/>
+          </a:p>
+          <a:p>
+            <a:pPr algn="ctr"/>
+            <a:endParaRPr lang="en-US" dirty="0"/>
+          </a:p>
+          <a:p>
+            <a:pPr algn="ctr"/>
+            <a:endParaRPr lang="en-US" dirty="0"/>
+          </a:p>
+          <a:p>
+            <a:pPr algn="ctr"/>
+            <a:endParaRPr lang="en-US" dirty="0"/>
+          </a:p>
+          <a:p>
+            <a:pPr algn="ctr"/>
+            <a:endParaRPr lang="en-US" dirty="0"/>
+          </a:p>
+          <a:p>
+            <a:pPr algn="ctr"/>
+            <a:endParaRPr lang="en-US" dirty="0"/>
+          </a:p>
+          <a:p>
+            <a:pPr algn="ctr"/>
+            <a:endParaRPr lang="en-US" dirty="0"/>
           </a:p>
         </p:txBody>
       </p:sp>
@@ -3519,7 +3599,7 @@
         <p:spPr>
           <a:xfrm>
             <a:off x="4607510" y="625194"/>
-            <a:ext cx="3281779" cy="1384995"/>
+            <a:ext cx="3281779" cy="4185761"/>
           </a:xfrm>
           <a:prstGeom prst="rect">
             <a:avLst/>
@@ -3555,6 +3635,71 @@
           </a:p>
           <a:p>
             <a:pPr algn="ctr"/>
+            <a:r>
+              <a:rPr lang="en-US" sz="1400" dirty="0"/>
+              <a:t>Dashboard output:</a:t>
+            </a:r>
+          </a:p>
+          <a:p>
+            <a:pPr algn="ctr"/>
+            <a:endParaRPr lang="en-US" sz="1400" dirty="0"/>
+          </a:p>
+          <a:p>
+            <a:pPr algn="ctr"/>
+            <a:r>
+              <a:rPr lang="en-US" sz="1400" dirty="0"/>
+              <a:t>Summary statistic table for sequencing quality </a:t>
+            </a:r>
+          </a:p>
+          <a:p>
+            <a:pPr marL="285750" indent="-285750" algn="ctr">
+              <a:buFont typeface="Arial" panose="020B0604020202020204" pitchFamily="34" charset="0"/>
+              <a:buChar char="•"/>
+            </a:pPr>
+            <a:r>
+              <a:rPr lang="en-US" sz="1400" dirty="0"/>
+              <a:t>Number of reads per sample</a:t>
+            </a:r>
+          </a:p>
+          <a:p>
+            <a:pPr marL="285750" indent="-285750" algn="ctr">
+              <a:buFont typeface="Arial" panose="020B0604020202020204" pitchFamily="34" charset="0"/>
+              <a:buChar char="•"/>
+            </a:pPr>
+            <a:r>
+              <a:rPr lang="en-US" sz="1400" dirty="0"/>
+              <a:t>Average length per read </a:t>
+            </a:r>
+          </a:p>
+          <a:p>
+            <a:pPr algn="ctr"/>
+            <a:endParaRPr lang="en-US" sz="1400" dirty="0"/>
+          </a:p>
+          <a:p>
+            <a:pPr algn="ctr"/>
+            <a:r>
+              <a:rPr lang="en-US" sz="1400" dirty="0"/>
+              <a:t>Graph of sequence quality by sequence base position</a:t>
+            </a:r>
+          </a:p>
+          <a:p>
+            <a:pPr algn="ctr"/>
+            <a:endParaRPr lang="en-US" sz="1400" dirty="0"/>
+          </a:p>
+          <a:p>
+            <a:pPr algn="ctr"/>
+            <a:endParaRPr lang="en-US" sz="1400" dirty="0"/>
+          </a:p>
+          <a:p>
+            <a:pPr algn="ctr"/>
+            <a:endParaRPr lang="en-US" sz="1400" dirty="0"/>
+          </a:p>
+          <a:p>
+            <a:pPr algn="ctr"/>
+            <a:endParaRPr lang="en-US" sz="1400" dirty="0"/>
+          </a:p>
+          <a:p>
+            <a:pPr algn="ctr"/>
             <a:endParaRPr lang="en-US" sz="1400" dirty="0"/>
           </a:p>
           <a:p>
@@ -3578,7 +3723,7 @@
         <p:spPr>
           <a:xfrm>
             <a:off x="8672835" y="625648"/>
-            <a:ext cx="2744806" cy="3539430"/>
+            <a:ext cx="2744806" cy="6709529"/>
           </a:xfrm>
           <a:prstGeom prst="rect">
             <a:avLst/>
@@ -3623,7 +3768,7 @@
             <a:pPr algn="ctr"/>
             <a:r>
               <a:rPr lang="en-US" sz="1400" dirty="0"/>
-              <a:t>INSERT GRAPH</a:t>
+              <a:t>Dashboard output:</a:t>
             </a:r>
           </a:p>
           <a:p>
@@ -3632,10 +3777,32 @@
           </a:p>
           <a:p>
             <a:pPr algn="ctr"/>
+            <a:r>
+              <a:rPr lang="en-US" sz="1400" dirty="0"/>
+              <a:t>Visualization of taxonomic classification by taxonomic level</a:t>
+            </a:r>
+          </a:p>
+          <a:p>
+            <a:pPr algn="ctr"/>
             <a:endParaRPr lang="en-US" sz="1400" dirty="0"/>
           </a:p>
           <a:p>
             <a:pPr algn="ctr"/>
+            <a:r>
+              <a:rPr lang="en-US" sz="1400" dirty="0"/>
+              <a:t>Summary statistics on diversity (alpha and beta) by various metrics (</a:t>
+            </a:r>
+            <a:r>
+              <a:rPr lang="en-US" sz="1400" dirty="0" err="1"/>
+              <a:t>Unifrac</a:t>
+            </a:r>
+            <a:r>
+              <a:rPr lang="en-US" sz="1400" dirty="0"/>
+              <a:t>, Bray-Curtis), microbiome uniqueness score between samples* </a:t>
+            </a:r>
+          </a:p>
+          <a:p>
+            <a:pPr algn="ctr"/>
             <a:endParaRPr lang="en-US" sz="1400" dirty="0"/>
           </a:p>
           <a:p>
@@ -3644,13 +3811,6 @@
           </a:p>
           <a:p>
             <a:pPr algn="ctr"/>
-            <a:r>
-              <a:rPr lang="en-US" sz="1400" dirty="0"/>
-              <a:t>INSERT GRAPH</a:t>
-            </a:r>
-          </a:p>
-          <a:p>
-            <a:pPr algn="ctr"/>
             <a:endParaRPr lang="en-US" sz="1400" dirty="0"/>
           </a:p>
           <a:p>
@@ -3667,10 +3827,50 @@
           </a:p>
           <a:p>
             <a:pPr algn="ctr"/>
-            <a:r>
-              <a:rPr lang="en-US" sz="1400" dirty="0"/>
-              <a:t>INSERT GRAPH</a:t>
-            </a:r>
+            <a:endParaRPr lang="en-US" sz="1400" dirty="0"/>
+          </a:p>
+          <a:p>
+            <a:pPr algn="ctr"/>
+            <a:endParaRPr lang="en-US" sz="1400" dirty="0"/>
+          </a:p>
+          <a:p>
+            <a:pPr algn="ctr"/>
+            <a:endParaRPr lang="en-US" sz="1400" dirty="0"/>
+          </a:p>
+          <a:p>
+            <a:pPr algn="ctr"/>
+            <a:endParaRPr lang="en-US" sz="1400" dirty="0"/>
+          </a:p>
+          <a:p>
+            <a:pPr algn="ctr"/>
+            <a:endParaRPr lang="en-US" sz="1400" dirty="0"/>
+          </a:p>
+          <a:p>
+            <a:pPr algn="ctr"/>
+            <a:r>
+              <a:rPr lang="en-US" sz="800" dirty="0"/>
+              <a:t>* Based on paper: Gut Microbiome Pattern Reflects Healthy Aging and Predicts Extended Survival in Humans, </a:t>
+            </a:r>
+            <a:r>
+              <a:rPr lang="en-US" sz="800" dirty="0" err="1"/>
+              <a:t>Wilmanski</a:t>
+            </a:r>
+            <a:r>
+              <a:rPr lang="en-US" sz="800" dirty="0"/>
+              <a:t> et al. </a:t>
+            </a:r>
+          </a:p>
+          <a:p>
+            <a:pPr algn="ctr"/>
+            <a:endParaRPr lang="en-US" sz="1400" dirty="0"/>
+          </a:p>
+          <a:p>
+            <a:pPr algn="ctr"/>
+            <a:endParaRPr lang="en-US" sz="1400" dirty="0"/>
+          </a:p>
+          <a:p>
+            <a:pPr algn="ctr"/>
+            <a:endParaRPr lang="en-US" sz="1400" dirty="0"/>
           </a:p>
         </p:txBody>
       </p:sp>
@@ -4237,6 +4437,119 @@
               <a:rPr lang="en-US" sz="1000" dirty="0"/>
               <a:t>Input</a:t>
             </a:r>
+          </a:p>
+        </p:txBody>
+      </p:sp>
+      <p:pic>
+        <p:nvPicPr>
+          <p:cNvPr id="38" name="Picture 37" descr="Chart, histogram&#10;&#10;Description automatically generated">
+            <a:extLst>
+              <a:ext uri="{FF2B5EF4-FFF2-40B4-BE49-F238E27FC236}">
+                <a16:creationId xmlns:a16="http://schemas.microsoft.com/office/drawing/2014/main" id="{7C11EF68-659A-D545-8DA1-6EDDDDAF9B06}"/>
+              </a:ext>
+            </a:extLst>
+          </p:cNvPr>
+          <p:cNvPicPr>
+            <a:picLocks noChangeAspect="1"/>
+          </p:cNvPicPr>
+          <p:nvPr/>
+        </p:nvPicPr>
+        <p:blipFill>
+          <a:blip r:embed="rId3">
+            <a:extLst>
+              <a:ext uri="{28A0092B-C50C-407E-A947-70E740481C1C}">
+                <a14:useLocalDpi xmlns:a14="http://schemas.microsoft.com/office/drawing/2010/main" val="0"/>
+              </a:ext>
+            </a:extLst>
+          </a:blip>
+          <a:stretch>
+            <a:fillRect/>
+          </a:stretch>
+        </p:blipFill>
+        <p:spPr>
+          <a:xfrm>
+            <a:off x="4628968" y="3954938"/>
+            <a:ext cx="3388148" cy="1954517"/>
+          </a:xfrm>
+          <a:prstGeom prst="rect">
+            <a:avLst/>
+          </a:prstGeom>
+        </p:spPr>
+      </p:pic>
+      <p:pic>
+        <p:nvPicPr>
+          <p:cNvPr id="1028" name="Picture 4" descr="Image result for abundance phylum bar plot">
+            <a:extLst>
+              <a:ext uri="{FF2B5EF4-FFF2-40B4-BE49-F238E27FC236}">
+                <a16:creationId xmlns:a16="http://schemas.microsoft.com/office/drawing/2014/main" id="{447F9026-EE59-1F43-880F-F23EC410F83D}"/>
+              </a:ext>
+            </a:extLst>
+          </p:cNvPr>
+          <p:cNvPicPr>
+            <a:picLocks noChangeAspect="1" noChangeArrowheads="1"/>
+          </p:cNvPicPr>
+          <p:nvPr/>
+        </p:nvPicPr>
+        <p:blipFill rotWithShape="1">
+          <a:blip r:embed="rId4">
+            <a:extLst>
+              <a:ext uri="{28A0092B-C50C-407E-A947-70E740481C1C}">
+                <a14:useLocalDpi xmlns:a14="http://schemas.microsoft.com/office/drawing/2010/main" val="0"/>
+              </a:ext>
+            </a:extLst>
+          </a:blip>
+          <a:srcRect l="12600" r="12532"/>
+          <a:stretch/>
+        </p:blipFill>
+        <p:spPr bwMode="auto">
+          <a:xfrm>
+            <a:off x="8243801" y="3860612"/>
+            <a:ext cx="3614921" cy="2283554"/>
+          </a:xfrm>
+          <a:prstGeom prst="rect">
+            <a:avLst/>
+          </a:prstGeom>
+          <a:noFill/>
+          <a:extLst>
+            <a:ext uri="{909E8E84-426E-40DD-AFC4-6F175D3DCCD1}">
+              <a14:hiddenFill xmlns:a14="http://schemas.microsoft.com/office/drawing/2010/main">
+                <a:solidFill>
+                  <a:srgbClr val="FFFFFF"/>
+                </a:solidFill>
+              </a14:hiddenFill>
+            </a:ext>
+          </a:extLst>
+        </p:spPr>
+      </p:pic>
+      <p:sp>
+        <p:nvSpPr>
+          <p:cNvPr id="39" name="TextBox 38">
+            <a:extLst>
+              <a:ext uri="{FF2B5EF4-FFF2-40B4-BE49-F238E27FC236}">
+                <a16:creationId xmlns:a16="http://schemas.microsoft.com/office/drawing/2014/main" id="{886133C7-8A10-5444-A713-120A0447A49C}"/>
+              </a:ext>
+            </a:extLst>
+          </p:cNvPr>
+          <p:cNvSpPr txBox="1"/>
+          <p:nvPr/>
+        </p:nvSpPr>
+        <p:spPr>
+          <a:xfrm>
+            <a:off x="12435840" y="6977575"/>
+            <a:ext cx="184731" cy="369332"/>
+          </a:xfrm>
+          <a:prstGeom prst="rect">
+            <a:avLst/>
+          </a:prstGeom>
+          <a:noFill/>
+        </p:spPr>
+        <p:txBody>
+          <a:bodyPr wrap="none" rtlCol="0">
+            <a:spAutoFit/>
+          </a:bodyPr>
+          <a:lstStyle/>
+          <a:p>
+            <a:endParaRPr lang="en-US" dirty="0"/>
           </a:p>
         </p:txBody>
       </p:sp>

</xml_diff>